<commit_message>
re-made the benchmarking figures
</commit_message>
<xml_diff>
--- a/CURRENT_FIGURES/benchmarking_figures.pptx
+++ b/CURRENT_FIGURES/benchmarking_figures.pptx
@@ -5,15 +5,16 @@
     <p:sldMasterId id="2147483648" r:id="rId1"/>
   </p:sldMasterIdLst>
   <p:notesMasterIdLst>
-    <p:notesMasterId r:id="rId8"/>
+    <p:notesMasterId r:id="rId9"/>
   </p:notesMasterIdLst>
   <p:sldIdLst>
     <p:sldId id="257" r:id="rId2"/>
     <p:sldId id="258" r:id="rId3"/>
-    <p:sldId id="259" r:id="rId4"/>
+    <p:sldId id="263" r:id="rId4"/>
     <p:sldId id="260" r:id="rId5"/>
     <p:sldId id="261" r:id="rId6"/>
-    <p:sldId id="262" r:id="rId7"/>
+    <p:sldId id="265" r:id="rId7"/>
+    <p:sldId id="262" r:id="rId8"/>
   </p:sldIdLst>
   <p:sldSz cx="12192000" cy="6858000"/>
   <p:notesSz cx="6858000" cy="9144000"/>
@@ -112,6 +113,11 @@
       </a:defRPr>
     </a:lvl9pPr>
   </p:defaultTextStyle>
+  <p:extLst>
+    <p:ext uri="{EFAFB233-063F-42B5-8137-9DF3F51BA10A}">
+      <p15:sldGuideLst xmlns:p15="http://schemas.microsoft.com/office/powerpoint/2012/main"/>
+    </p:ext>
+  </p:extLst>
 </p:presentation>
 </file>
 
@@ -511,11 +517,15 @@
           <a:p>
             <a:r>
               <a:rPr lang="en-US" dirty="0" smtClean="0"/>
-              <a:t>Figure 2. Recall</a:t>
+              <a:t>Figure. Completion </a:t>
             </a:r>
             <a:r>
               <a:rPr lang="en-US" baseline="0" dirty="0" smtClean="0"/>
-              <a:t> and precision of bins recovered from the CAMI binning challenge synthetic data sets using different binning strategies. The bin sets in dashed lines (metaBAT2, MaxBin2, CONCOCT) are original sets, while the bin sets in solid lines (</a:t>
+              <a:t>and contamination of </a:t>
+            </a:r>
+            <a:r>
+              <a:rPr lang="en-US" baseline="0" dirty="0" smtClean="0"/>
+              <a:t>bins recovered from the CAMI binning challenge synthetic data sets using different binning strategies. The bin sets in dashed lines (metaBAT2, MaxBin2, CONCOCT) are original sets, while the bin sets in solid lines (</a:t>
             </a:r>
             <a:r>
               <a:rPr lang="en-US" baseline="0" dirty="0" err="1" smtClean="0"/>
@@ -531,7 +541,23 @@
             </a:r>
             <a:r>
               <a:rPr lang="en-US" baseline="0" dirty="0" smtClean="0"/>
-              <a:t>, metaWRAP) are bins produced by combining the original three sets. Only bins with a recall of greater than 0.5 and precision greater than 0.9 are shown.</a:t>
+              <a:t>, metaWRAP) are bins produced by combining the original three sets. Only bins with a recall of greater than </a:t>
+            </a:r>
+            <a:r>
+              <a:rPr lang="en-US" baseline="0" dirty="0" smtClean="0"/>
+              <a:t>50% </a:t>
+            </a:r>
+            <a:r>
+              <a:rPr lang="en-US" baseline="0" dirty="0" smtClean="0"/>
+              <a:t>and </a:t>
+            </a:r>
+            <a:r>
+              <a:rPr lang="en-US" baseline="0" dirty="0" smtClean="0"/>
+              <a:t>completion and less than 10% contamination are </a:t>
+            </a:r>
+            <a:r>
+              <a:rPr lang="en-US" baseline="0" dirty="0" smtClean="0"/>
+              <a:t>shown.</a:t>
             </a:r>
             <a:endParaRPr lang="en-US" dirty="0"/>
           </a:p>
@@ -617,26 +643,21 @@
           <a:bodyPr/>
           <a:lstStyle/>
           <a:p>
-            <a:pPr marL="0" marR="0" indent="0" algn="l" defTabSz="914400" rtl="0" eaLnBrk="1" fontAlgn="auto" latinLnBrk="0" hangingPunct="1">
-              <a:lnSpc>
-                <a:spcPct val="100000"/>
-              </a:lnSpc>
-              <a:spcBef>
-                <a:spcPts val="0"/>
-              </a:spcBef>
-              <a:spcAft>
-                <a:spcPts val="0"/>
-              </a:spcAft>
-              <a:buClrTx/>
-              <a:buSzTx/>
-              <a:buFontTx/>
-              <a:buNone/>
-              <a:tabLst/>
-              <a:defRPr/>
-            </a:pPr>
             <a:r>
               <a:rPr lang="en-US" dirty="0" smtClean="0"/>
-              <a:t>Figure 2. Recall</a:t>
+              <a:t>Supplementary</a:t>
+            </a:r>
+            <a:r>
+              <a:rPr lang="en-US" baseline="0" dirty="0" smtClean="0"/>
+              <a:t> f</a:t>
+            </a:r>
+            <a:r>
+              <a:rPr lang="en-US" dirty="0" smtClean="0"/>
+              <a:t>igure. </a:t>
+            </a:r>
+            <a:r>
+              <a:rPr lang="en-US" dirty="0" smtClean="0"/>
+              <a:t>Recall</a:t>
             </a:r>
             <a:r>
               <a:rPr lang="en-US" baseline="0" dirty="0" smtClean="0"/>
@@ -658,9 +679,6 @@
               <a:rPr lang="en-US" baseline="0" dirty="0" smtClean="0"/>
               <a:t>, metaWRAP) are bins produced by combining the original three sets. Only bins with a recall of greater than 0.5 and precision greater than 0.9 are shown.</a:t>
             </a:r>
-            <a:endParaRPr lang="en-US" dirty="0" smtClean="0"/>
-          </a:p>
-          <a:p>
             <a:endParaRPr lang="en-US" dirty="0"/>
           </a:p>
         </p:txBody>
@@ -691,7 +709,7 @@
     </p:spTree>
     <p:extLst>
       <p:ext uri="{BB962C8B-B14F-4D97-AF65-F5344CB8AC3E}">
-        <p14:creationId xmlns:p14="http://schemas.microsoft.com/office/powerpoint/2010/main" val="789583432"/>
+        <p14:creationId xmlns:p14="http://schemas.microsoft.com/office/powerpoint/2010/main" val="307645312"/>
       </p:ext>
     </p:extLst>
   </p:cSld>
@@ -747,7 +765,11 @@
           <a:p>
             <a:r>
               <a:rPr lang="en-US" dirty="0" smtClean="0"/>
-              <a:t>Figure 3. Completion and contamination </a:t>
+              <a:t>Figure. </a:t>
+            </a:r>
+            <a:r>
+              <a:rPr lang="en-US" dirty="0" smtClean="0"/>
+              <a:t>Completion and contamination </a:t>
             </a:r>
             <a:r>
               <a:rPr lang="en-US" baseline="0" dirty="0" smtClean="0"/>
@@ -861,13 +883,46 @@
           <a:bodyPr/>
           <a:lstStyle/>
           <a:p>
+            <a:pPr marL="0" marR="0" indent="0" algn="l" defTabSz="914400" rtl="0" eaLnBrk="1" fontAlgn="auto" latinLnBrk="0" hangingPunct="1">
+              <a:lnSpc>
+                <a:spcPct val="100000"/>
+              </a:lnSpc>
+              <a:spcBef>
+                <a:spcPts val="0"/>
+              </a:spcBef>
+              <a:spcAft>
+                <a:spcPts val="0"/>
+              </a:spcAft>
+              <a:buClrTx/>
+              <a:buSzTx/>
+              <a:buFontTx/>
+              <a:buNone/>
+              <a:tabLst/>
+              <a:defRPr/>
+            </a:pPr>
             <a:r>
               <a:rPr lang="en-US" dirty="0" smtClean="0"/>
-              <a:t>Figure S4. </a:t>
+              <a:t>Supplementary figure. </a:t>
             </a:r>
             <a:r>
               <a:rPr lang="en-US" baseline="0" dirty="0" smtClean="0"/>
-              <a:t>Completion and contamination rankings of bins recovered from different metagenomic data sets by using metaWRAP with different parameters. The numbers in the brackets indicate the number of extra bins gained at that threshold compared to the baseline (running metaWRAP with minimum completion of 50% and maximum contamination of 10%). A: Completion of metaWRAP bins with a varying minimum completion parameter (-c), but constant maximum contamination parameter (-x 10). B: Contamination of metaWRAP bins with a varying maximum contamination parameter (-x), but constant minimum completion parameter (-x 50). </a:t>
+              <a:t>Completion </a:t>
+            </a:r>
+            <a:r>
+              <a:rPr lang="en-US" baseline="0" dirty="0" smtClean="0"/>
+              <a:t>of </a:t>
+            </a:r>
+            <a:r>
+              <a:rPr lang="en-US" baseline="0" dirty="0" smtClean="0"/>
+              <a:t>bins recovered from different metagenomic data sets by using metaWRAP </a:t>
+            </a:r>
+            <a:r>
+              <a:rPr lang="en-US" baseline="0" dirty="0" smtClean="0"/>
+              <a:t>with a varying minimum completion parameter (-c), but constant maximum contamination parameter (-x 10). </a:t>
+            </a:r>
+            <a:r>
+              <a:rPr lang="en-US" baseline="0" dirty="0" smtClean="0"/>
+              <a:t>The numbers in the brackets indicate the number of extra bins gained at that threshold compared to the baseline (running metaWRAP with minimum completion of 50% and maximum contamination of 10%). </a:t>
             </a:r>
             <a:endParaRPr lang="en-US" dirty="0"/>
           </a:p>
@@ -953,9 +1008,122 @@
           <a:bodyPr/>
           <a:lstStyle/>
           <a:p>
+            <a:pPr marL="0" marR="0" indent="0" algn="l" defTabSz="914400" rtl="0" eaLnBrk="1" fontAlgn="auto" latinLnBrk="0" hangingPunct="1">
+              <a:lnSpc>
+                <a:spcPct val="100000"/>
+              </a:lnSpc>
+              <a:spcBef>
+                <a:spcPts val="0"/>
+              </a:spcBef>
+              <a:spcAft>
+                <a:spcPts val="0"/>
+              </a:spcAft>
+              <a:buClrTx/>
+              <a:buSzTx/>
+              <a:buFontTx/>
+              <a:buNone/>
+              <a:tabLst/>
+              <a:defRPr/>
+            </a:pPr>
             <a:r>
               <a:rPr lang="en-US" dirty="0" smtClean="0"/>
-              <a:t>Figure 4. Comparison of N50, completion, and contamination metrics of original</a:t>
+              <a:t>Supplementary figure. </a:t>
+            </a:r>
+            <a:r>
+              <a:rPr lang="en-US" baseline="0" dirty="0" smtClean="0"/>
+              <a:t>Contamination of bins recovered from different metagenomic data sets by using metaWRAP with a varying maximum contamination parameter (-x), but constant minimum completion parameter (-c 50). The numbers in the brackets indicate the number of extra bins gained at that threshold compared to the baseline (running metaWRAP with minimum completion of 50% and maximum contamination of 10%). </a:t>
+            </a:r>
+            <a:endParaRPr lang="en-US" dirty="0"/>
+          </a:p>
+        </p:txBody>
+      </p:sp>
+      <p:sp>
+        <p:nvSpPr>
+          <p:cNvPr id="4" name="Slide Number Placeholder 3"/>
+          <p:cNvSpPr>
+            <a:spLocks noGrp="1"/>
+          </p:cNvSpPr>
+          <p:nvPr>
+            <p:ph type="sldNum" sz="quarter" idx="10"/>
+          </p:nvPr>
+        </p:nvSpPr>
+        <p:spPr/>
+        <p:txBody>
+          <a:bodyPr/>
+          <a:lstStyle/>
+          <a:p>
+            <a:fld id="{89A5E7C1-57C9-8E40-9255-A164967D22C5}" type="slidenum">
+              <a:rPr lang="en-US" smtClean="0"/>
+              <a:t>6</a:t>
+            </a:fld>
+            <a:endParaRPr lang="en-US"/>
+          </a:p>
+        </p:txBody>
+      </p:sp>
+    </p:spTree>
+    <p:extLst>
+      <p:ext uri="{BB962C8B-B14F-4D97-AF65-F5344CB8AC3E}">
+        <p14:creationId xmlns:p14="http://schemas.microsoft.com/office/powerpoint/2010/main" val="1934128502"/>
+      </p:ext>
+    </p:extLst>
+  </p:cSld>
+  <p:clrMapOvr>
+    <a:masterClrMapping/>
+  </p:clrMapOvr>
+</p:notes>
+</file>
+
+<file path=ppt/notesSlides/notesSlide6.xml><?xml version="1.0" encoding="utf-8"?>
+<p:notes xmlns:a="http://schemas.openxmlformats.org/drawingml/2006/main" xmlns:r="http://schemas.openxmlformats.org/officeDocument/2006/relationships" xmlns:p="http://schemas.openxmlformats.org/presentationml/2006/main">
+  <p:cSld>
+    <p:spTree>
+      <p:nvGrpSpPr>
+        <p:cNvPr id="1" name=""/>
+        <p:cNvGrpSpPr/>
+        <p:nvPr/>
+      </p:nvGrpSpPr>
+      <p:grpSpPr>
+        <a:xfrm>
+          <a:off x="0" y="0"/>
+          <a:ext cx="0" cy="0"/>
+          <a:chOff x="0" y="0"/>
+          <a:chExt cx="0" cy="0"/>
+        </a:xfrm>
+      </p:grpSpPr>
+      <p:sp>
+        <p:nvSpPr>
+          <p:cNvPr id="2" name="Slide Image Placeholder 1"/>
+          <p:cNvSpPr>
+            <a:spLocks noGrp="1" noRot="1" noChangeAspect="1"/>
+          </p:cNvSpPr>
+          <p:nvPr>
+            <p:ph type="sldImg"/>
+          </p:nvPr>
+        </p:nvSpPr>
+        <p:spPr/>
+      </p:sp>
+      <p:sp>
+        <p:nvSpPr>
+          <p:cNvPr id="3" name="Notes Placeholder 2"/>
+          <p:cNvSpPr>
+            <a:spLocks noGrp="1"/>
+          </p:cNvSpPr>
+          <p:nvPr>
+            <p:ph type="body" idx="1"/>
+          </p:nvPr>
+        </p:nvSpPr>
+        <p:spPr/>
+        <p:txBody>
+          <a:bodyPr/>
+          <a:lstStyle/>
+          <a:p>
+            <a:r>
+              <a:rPr lang="en-US" smtClean="0"/>
+              <a:t>Figure. </a:t>
+            </a:r>
+            <a:r>
+              <a:rPr lang="en-US" dirty="0" smtClean="0"/>
+              <a:t>Comparison of N50, completion, and contamination metrics of original</a:t>
             </a:r>
             <a:r>
               <a:rPr lang="en-US" baseline="0" dirty="0" smtClean="0"/>
@@ -1014,7 +1182,7 @@
           <a:p>
             <a:fld id="{9808BE16-2894-CB47-8B89-49BB5F20AD95}" type="slidenum">
               <a:rPr lang="en-US" smtClean="0"/>
-              <a:t>6</a:t>
+              <a:t>7</a:t>
             </a:fld>
             <a:endParaRPr lang="en-US"/>
           </a:p>
@@ -4027,7 +4195,7 @@
       </p:grpSpPr>
       <p:pic>
         <p:nvPicPr>
-          <p:cNvPr id="3" name="Picture 2"/>
+          <p:cNvPr id="2" name="Picture 1"/>
           <p:cNvPicPr>
             <a:picLocks noChangeAspect="1"/>
           </p:cNvPicPr>
@@ -4113,7 +4281,7 @@
     </p:spTree>
     <p:extLst>
       <p:ext uri="{BB962C8B-B14F-4D97-AF65-F5344CB8AC3E}">
-        <p14:creationId xmlns:p14="http://schemas.microsoft.com/office/powerpoint/2010/main" val="2017713087"/>
+        <p14:creationId xmlns:p14="http://schemas.microsoft.com/office/powerpoint/2010/main" val="1114200336"/>
       </p:ext>
     </p:extLst>
   </p:cSld>
@@ -4149,7 +4317,7 @@
       </p:grpSpPr>
       <p:pic>
         <p:nvPicPr>
-          <p:cNvPr id="4" name="Picture 3"/>
+          <p:cNvPr id="2" name="Picture 1"/>
           <p:cNvPicPr>
             <a:picLocks noChangeAspect="1"/>
           </p:cNvPicPr>
@@ -4210,7 +4378,7 @@
       </p:grpSpPr>
       <p:pic>
         <p:nvPicPr>
-          <p:cNvPr id="4" name="Picture 3"/>
+          <p:cNvPr id="2" name="Picture 1"/>
           <p:cNvPicPr>
             <a:picLocks noChangeAspect="1"/>
           </p:cNvPicPr>
@@ -4224,8 +4392,8 @@
         </p:blipFill>
         <p:spPr>
           <a:xfrm>
-            <a:off x="1524000" y="0"/>
-            <a:ext cx="9144000" cy="6858000"/>
+            <a:off x="3238500" y="0"/>
+            <a:ext cx="5715000" cy="6858000"/>
           </a:xfrm>
           <a:prstGeom prst="rect">
             <a:avLst/>
@@ -4271,7 +4439,7 @@
       </p:grpSpPr>
       <p:pic>
         <p:nvPicPr>
-          <p:cNvPr id="3" name="Picture 2"/>
+          <p:cNvPr id="4" name="Picture 3"/>
           <p:cNvPicPr>
             <a:picLocks noChangeAspect="1"/>
           </p:cNvPicPr>
@@ -4285,8 +4453,62 @@
         </p:blipFill>
         <p:spPr>
           <a:xfrm>
-            <a:off x="889870" y="0"/>
-            <a:ext cx="10287000" cy="6858000"/>
+            <a:off x="3238500" y="0"/>
+            <a:ext cx="5715000" cy="6858000"/>
+          </a:xfrm>
+          <a:prstGeom prst="rect">
+            <a:avLst/>
+          </a:prstGeom>
+        </p:spPr>
+      </p:pic>
+    </p:spTree>
+    <p:extLst>
+      <p:ext uri="{BB962C8B-B14F-4D97-AF65-F5344CB8AC3E}">
+        <p14:creationId xmlns:p14="http://schemas.microsoft.com/office/powerpoint/2010/main" val="1452313413"/>
+      </p:ext>
+    </p:extLst>
+  </p:cSld>
+  <p:clrMapOvr>
+    <a:masterClrMapping/>
+  </p:clrMapOvr>
+</p:sld>
+</file>
+
+<file path=ppt/slides/slide7.xml><?xml version="1.0" encoding="utf-8"?>
+<p:sld xmlns:a="http://schemas.openxmlformats.org/drawingml/2006/main" xmlns:r="http://schemas.openxmlformats.org/officeDocument/2006/relationships" xmlns:p="http://schemas.openxmlformats.org/presentationml/2006/main">
+  <p:cSld>
+    <p:spTree>
+      <p:nvGrpSpPr>
+        <p:cNvPr id="1" name=""/>
+        <p:cNvGrpSpPr/>
+        <p:nvPr/>
+      </p:nvGrpSpPr>
+      <p:grpSpPr>
+        <a:xfrm>
+          <a:off x="0" y="0"/>
+          <a:ext cx="0" cy="0"/>
+          <a:chOff x="0" y="0"/>
+          <a:chExt cx="0" cy="0"/>
+        </a:xfrm>
+      </p:grpSpPr>
+      <p:pic>
+        <p:nvPicPr>
+          <p:cNvPr id="2" name="Picture 1"/>
+          <p:cNvPicPr>
+            <a:picLocks noChangeAspect="1"/>
+          </p:cNvPicPr>
+          <p:nvPr/>
+        </p:nvPicPr>
+        <p:blipFill>
+          <a:blip r:embed="rId3"/>
+          <a:stretch>
+            <a:fillRect/>
+          </a:stretch>
+        </p:blipFill>
+        <p:spPr>
+          <a:xfrm>
+            <a:off x="1524000" y="0"/>
+            <a:ext cx="9144000" cy="6858000"/>
           </a:xfrm>
           <a:prstGeom prst="rect">
             <a:avLst/>

</xml_diff>